<commit_message>
Chip 1 done, on to chip 2
</commit_message>
<xml_diff>
--- a/presentations/Updates 8-4-20.pptx
+++ b/presentations/Updates 8-4-20.pptx
@@ -155,7 +155,7 @@
 <file path=ppt/revisionInfo.xml><?xml version="1.0" encoding="utf-8"?>
 <p1510:revInfo xmlns:a="http://schemas.openxmlformats.org/drawingml/2006/main" xmlns:r="http://schemas.openxmlformats.org/officeDocument/2006/relationships" xmlns:p1510="http://schemas.microsoft.com/office/powerpoint/2015/10/main">
   <p1510:revLst>
-    <p1510:client id="{593DE006-A78F-1A44-90CA-63CFD0BF0D77}" v="20" dt="2020-08-08T11:47:15.956"/>
+    <p1510:client id="{593DE006-A78F-1A44-90CA-63CFD0BF0D77}" v="22" dt="2020-08-09T06:17:55.970"/>
   </p1510:revLst>
 </p1510:revInfo>
 </file>
@@ -165,10 +165,25 @@
   <pc:docChgLst>
     <pc:chgData name="Akash Levy" userId="0f662538-7453-45f3-952a-fc9f1a7c515e" providerId="ADAL" clId="{593DE006-A78F-1A44-90CA-63CFD0BF0D77}"/>
     <pc:docChg chg="undo custSel mod addSld delSld modSld">
-      <pc:chgData name="Akash Levy" userId="0f662538-7453-45f3-952a-fc9f1a7c515e" providerId="ADAL" clId="{593DE006-A78F-1A44-90CA-63CFD0BF0D77}" dt="2020-08-08T11:47:37.372" v="276" actId="20577"/>
+      <pc:chgData name="Akash Levy" userId="0f662538-7453-45f3-952a-fc9f1a7c515e" providerId="ADAL" clId="{593DE006-A78F-1A44-90CA-63CFD0BF0D77}" dt="2020-08-09T06:18:57.935" v="310" actId="20577"/>
       <pc:docMkLst>
         <pc:docMk/>
       </pc:docMkLst>
+      <pc:sldChg chg="modSp mod">
+        <pc:chgData name="Akash Levy" userId="0f662538-7453-45f3-952a-fc9f1a7c515e" providerId="ADAL" clId="{593DE006-A78F-1A44-90CA-63CFD0BF0D77}" dt="2020-08-09T06:18:48.701" v="302" actId="20577"/>
+        <pc:sldMkLst>
+          <pc:docMk/>
+          <pc:sldMk cId="2254662136" sldId="262"/>
+        </pc:sldMkLst>
+        <pc:spChg chg="mod">
+          <ac:chgData name="Akash Levy" userId="0f662538-7453-45f3-952a-fc9f1a7c515e" providerId="ADAL" clId="{593DE006-A78F-1A44-90CA-63CFD0BF0D77}" dt="2020-08-09T06:18:48.701" v="302" actId="20577"/>
+          <ac:spMkLst>
+            <pc:docMk/>
+            <pc:sldMk cId="2254662136" sldId="262"/>
+            <ac:spMk id="2" creationId="{0DC20D0A-1987-9B4E-A869-51F473A5029A}"/>
+          </ac:spMkLst>
+        </pc:spChg>
+      </pc:sldChg>
       <pc:sldChg chg="modSp mod">
         <pc:chgData name="Akash Levy" userId="0f662538-7453-45f3-952a-fc9f1a7c515e" providerId="ADAL" clId="{593DE006-A78F-1A44-90CA-63CFD0BF0D77}" dt="2020-08-07T03:08:18.195" v="37" actId="12"/>
         <pc:sldMkLst>
@@ -373,7 +388,7 @@
         </pc:picChg>
       </pc:sldChg>
       <pc:sldChg chg="addSp delSp modSp add mod setBg delDesignElem">
-        <pc:chgData name="Akash Levy" userId="0f662538-7453-45f3-952a-fc9f1a7c515e" providerId="ADAL" clId="{593DE006-A78F-1A44-90CA-63CFD0BF0D77}" dt="2020-08-08T11:47:37.372" v="276" actId="20577"/>
+        <pc:chgData name="Akash Levy" userId="0f662538-7453-45f3-952a-fc9f1a7c515e" providerId="ADAL" clId="{593DE006-A78F-1A44-90CA-63CFD0BF0D77}" dt="2020-08-09T06:18:15.449" v="292" actId="20577"/>
         <pc:sldMkLst>
           <pc:docMk/>
           <pc:sldMk cId="608987082" sldId="302"/>
@@ -435,7 +450,7 @@
           </ac:spMkLst>
         </pc:spChg>
         <pc:graphicFrameChg chg="mod modGraphic">
-          <ac:chgData name="Akash Levy" userId="0f662538-7453-45f3-952a-fc9f1a7c515e" providerId="ADAL" clId="{593DE006-A78F-1A44-90CA-63CFD0BF0D77}" dt="2020-08-08T11:47:37.372" v="276" actId="20577"/>
+          <ac:chgData name="Akash Levy" userId="0f662538-7453-45f3-952a-fc9f1a7c515e" providerId="ADAL" clId="{593DE006-A78F-1A44-90CA-63CFD0BF0D77}" dt="2020-08-09T06:18:15.449" v="292" actId="20577"/>
           <ac:graphicFrameMkLst>
             <pc:docMk/>
             <pc:sldMk cId="608987082" sldId="302"/>
@@ -577,14 +592,22 @@
           </ac:graphicFrameMkLst>
         </pc:graphicFrameChg>
       </pc:sldChg>
-      <pc:sldChg chg="modSp add">
-        <pc:chgData name="Akash Levy" userId="0f662538-7453-45f3-952a-fc9f1a7c515e" providerId="ADAL" clId="{593DE006-A78F-1A44-90CA-63CFD0BF0D77}" dt="2020-08-08T11:47:15.956" v="272" actId="14826"/>
+      <pc:sldChg chg="modSp add mod">
+        <pc:chgData name="Akash Levy" userId="0f662538-7453-45f3-952a-fc9f1a7c515e" providerId="ADAL" clId="{593DE006-A78F-1A44-90CA-63CFD0BF0D77}" dt="2020-08-09T06:18:57.935" v="310" actId="20577"/>
         <pc:sldMkLst>
           <pc:docMk/>
           <pc:sldMk cId="46029948" sldId="305"/>
         </pc:sldMkLst>
+        <pc:spChg chg="mod">
+          <ac:chgData name="Akash Levy" userId="0f662538-7453-45f3-952a-fc9f1a7c515e" providerId="ADAL" clId="{593DE006-A78F-1A44-90CA-63CFD0BF0D77}" dt="2020-08-09T06:18:57.935" v="310" actId="20577"/>
+          <ac:spMkLst>
+            <pc:docMk/>
+            <pc:sldMk cId="46029948" sldId="305"/>
+            <ac:spMk id="2" creationId="{0DC20D0A-1987-9B4E-A869-51F473A5029A}"/>
+          </ac:spMkLst>
+        </pc:spChg>
         <pc:picChg chg="mod">
-          <ac:chgData name="Akash Levy" userId="0f662538-7453-45f3-952a-fc9f1a7c515e" providerId="ADAL" clId="{593DE006-A78F-1A44-90CA-63CFD0BF0D77}" dt="2020-08-08T11:47:15.956" v="272" actId="14826"/>
+          <ac:chgData name="Akash Levy" userId="0f662538-7453-45f3-952a-fc9f1a7c515e" providerId="ADAL" clId="{593DE006-A78F-1A44-90CA-63CFD0BF0D77}" dt="2020-08-09T06:17:14.151" v="277" actId="14826"/>
           <ac:picMkLst>
             <pc:docMk/>
             <pc:sldMk cId="46029948" sldId="305"/>
@@ -15628,7 +15651,7 @@
           <a:p>
             <a:pPr algn="ctr"/>
             <a:r>
-              <a:rPr lang="en-US" sz="2600" kern="1200">
+              <a:rPr lang="en-US" sz="2600" kern="1200" dirty="0">
                 <a:solidFill>
                   <a:srgbClr val="FFFFFF"/>
                 </a:solidFill>
@@ -15636,7 +15659,7 @@
                 <a:ea typeface="+mj-ea"/>
                 <a:cs typeface="+mj-cs"/>
               </a:rPr>
-              <a:t>Algorithm evaluation on 4 WLs</a:t>
+              <a:t>Algorithm evaluation on 4 WLs: chip 1</a:t>
             </a:r>
           </a:p>
         </p:txBody>
@@ -22616,7 +22639,7 @@
           <a:p>
             <a:pPr algn="ctr"/>
             <a:r>
-              <a:rPr lang="en-US" sz="2600" kern="1200">
+              <a:rPr lang="en-US" sz="2600" kern="1200" dirty="0">
                 <a:solidFill>
                   <a:srgbClr val="FFFFFF"/>
                 </a:solidFill>
@@ -22624,7 +22647,7 @@
                 <a:ea typeface="+mj-ea"/>
                 <a:cs typeface="+mj-cs"/>
               </a:rPr>
-              <a:t>Algorithm evaluation on 4 WLs</a:t>
+              <a:t>Algorithm evaluation on 4 WLs: chip 1</a:t>
             </a:r>
           </a:p>
         </p:txBody>
@@ -22902,7 +22925,7 @@
           <p:nvPr>
             <p:extLst>
               <p:ext uri="{D42A27DB-BD31-4B8C-83A1-F6EECF244321}">
-                <p14:modId xmlns:p14="http://schemas.microsoft.com/office/powerpoint/2010/main" val="3984015456"/>
+                <p14:modId xmlns:p14="http://schemas.microsoft.com/office/powerpoint/2010/main" val="3629883651"/>
               </p:ext>
             </p:extLst>
           </p:nvPr>
@@ -24136,18 +24159,13 @@
                     <a:lstStyle/>
                     <a:p>
                       <a:r>
-                        <a:rPr lang="en-US" sz="2600" cap="none" spc="0">
+                        <a:rPr lang="en-US" sz="2600" cap="none" spc="0" dirty="0">
                           <a:solidFill>
                             <a:schemeClr val="tx1"/>
                           </a:solidFill>
                         </a:rPr>
-                        <a:t>TODO</a:t>
+                        <a:t>9.10</a:t>
                       </a:r>
-                      <a:endParaRPr lang="en-US" sz="2600" cap="none" spc="0" dirty="0">
-                        <a:solidFill>
-                          <a:schemeClr val="tx1"/>
-                        </a:solidFill>
-                      </a:endParaRPr>
                     </a:p>
                   </a:txBody>
                   <a:tcPr marL="220027" marR="163524" marT="169253" marB="169253">
@@ -24204,18 +24222,13 @@
                     <a:lstStyle/>
                     <a:p>
                       <a:r>
-                        <a:rPr lang="en-US" sz="2600" cap="none" spc="0">
+                        <a:rPr lang="en-US" sz="2600" cap="none" spc="0" dirty="0">
                           <a:solidFill>
                             <a:schemeClr val="tx1"/>
                           </a:solidFill>
                         </a:rPr>
-                        <a:t>TODO</a:t>
+                        <a:t>24.16</a:t>
                       </a:r>
-                      <a:endParaRPr lang="en-US" sz="2600" cap="none" spc="0" dirty="0">
-                        <a:solidFill>
-                          <a:schemeClr val="tx1"/>
-                        </a:solidFill>
-                      </a:endParaRPr>
                     </a:p>
                   </a:txBody>
                   <a:tcPr marL="220027" marR="163524" marT="169253" marB="169253">
@@ -24272,18 +24285,13 @@
                     <a:lstStyle/>
                     <a:p>
                       <a:r>
-                        <a:rPr lang="en-US" sz="2600" cap="none" spc="0">
+                        <a:rPr lang="en-US" sz="2600" cap="none" spc="0" dirty="0">
                           <a:solidFill>
                             <a:schemeClr val="tx1"/>
                           </a:solidFill>
                         </a:rPr>
-                        <a:t>TODO</a:t>
+                        <a:t>54.12</a:t>
                       </a:r>
-                      <a:endParaRPr lang="en-US" sz="2600" cap="none" spc="0" dirty="0">
-                        <a:solidFill>
-                          <a:schemeClr val="tx1"/>
-                        </a:solidFill>
-                      </a:endParaRPr>
                     </a:p>
                   </a:txBody>
                   <a:tcPr marL="220027" marR="163524" marT="169253" marB="169253">

</xml_diff>